<commit_message>
67763 Sprint1 Amend - Review phase in scrum board must have effort attributed to it in burndown (they count as part of the task)
</commit_message>
<xml_diff>
--- a/SE202526/Management/Scrum Board.pptx
+++ b/SE202526/Management/Scrum Board.pptx
@@ -289,7 +289,7 @@
   <pc:docChgLst>
     <pc:chgData name="Diogo Antunes" userId="059c692484dd0481" providerId="LiveId" clId="{73D4D07A-0778-410B-AF19-12D9596F88EC}"/>
     <pc:docChg chg="undo custSel addSld delSld modSld">
-      <pc:chgData name="Diogo Antunes" userId="059c692484dd0481" providerId="LiveId" clId="{73D4D07A-0778-410B-AF19-12D9596F88EC}" dt="2025-10-19T12:57:13.882" v="3457" actId="6549"/>
+      <pc:chgData name="Diogo Antunes" userId="059c692484dd0481" providerId="LiveId" clId="{73D4D07A-0778-410B-AF19-12D9596F88EC}" dt="2025-10-20T14:27:32.148" v="3458" actId="1076"/>
       <pc:docMkLst>
         <pc:docMk/>
       </pc:docMkLst>
@@ -2136,7 +2136,7 @@
         </pc:spChg>
       </pc:sldChg>
       <pc:sldChg chg="modSp add mod">
-        <pc:chgData name="Diogo Antunes" userId="059c692484dd0481" providerId="LiveId" clId="{73D4D07A-0778-410B-AF19-12D9596F88EC}" dt="2025-10-19T12:57:13.882" v="3457" actId="6549"/>
+        <pc:chgData name="Diogo Antunes" userId="059c692484dd0481" providerId="LiveId" clId="{73D4D07A-0778-410B-AF19-12D9596F88EC}" dt="2025-10-20T14:27:32.148" v="3458" actId="1076"/>
         <pc:sldMkLst>
           <pc:docMk/>
           <pc:sldMk cId="3301943340" sldId="314"/>
@@ -2150,7 +2150,7 @@
           </ac:spMkLst>
         </pc:spChg>
         <pc:spChg chg="mod">
-          <ac:chgData name="Diogo Antunes" userId="059c692484dd0481" providerId="LiveId" clId="{73D4D07A-0778-410B-AF19-12D9596F88EC}" dt="2025-10-19T12:45:00.538" v="3361" actId="1076"/>
+          <ac:chgData name="Diogo Antunes" userId="059c692484dd0481" providerId="LiveId" clId="{73D4D07A-0778-410B-AF19-12D9596F88EC}" dt="2025-10-20T14:27:32.148" v="3458" actId="1076"/>
           <ac:spMkLst>
             <pc:docMk/>
             <pc:sldMk cId="3301943340" sldId="314"/>
@@ -21424,7 +21424,7 @@
         </p:nvSpPr>
         <p:spPr>
           <a:xfrm>
-            <a:off x="12396215" y="5524588"/>
+            <a:off x="9256129" y="5530450"/>
             <a:ext cx="2519447" cy="1461874"/>
           </a:xfrm>
           <a:prstGeom prst="roundRect">

</xml_diff>